<commit_message>
Revisão algotitmos corrigida closes #52
</commit_message>
<xml_diff>
--- a/1º semestre/Revisões by danny/2º bimestre/Revisão Algoritmos.pptx
+++ b/1º semestre/Revisões by danny/2º bimestre/Revisão Algoritmos.pptx
@@ -5,7 +5,7 @@
     <p:sldMasterId id="2147483648" r:id="rId1"/>
   </p:sldMasterIdLst>
   <p:notesMasterIdLst>
-    <p:notesMasterId r:id="rId21"/>
+    <p:notesMasterId r:id="rId22"/>
   </p:notesMasterIdLst>
   <p:sldIdLst>
     <p:sldId id="256" r:id="rId2"/>
@@ -27,6 +27,7 @@
     <p:sldId id="270" r:id="rId18"/>
     <p:sldId id="271" r:id="rId19"/>
     <p:sldId id="272" r:id="rId20"/>
+    <p:sldId id="278" r:id="rId21"/>
   </p:sldIdLst>
   <p:sldSz cx="12192000" cy="6858000"/>
   <p:notesSz cx="6858000" cy="9144000"/>
@@ -215,7 +216,7 @@
           <a:p>
             <a:fld id="{0EDE2110-337E-4A4E-801C-86CE88B7C597}" type="datetimeFigureOut">
               <a:rPr lang="pt-BR" smtClean="0"/>
-              <a:t>13/06/2018</a:t>
+              <a:t>19/06/2018</a:t>
             </a:fld>
             <a:endParaRPr lang="pt-BR"/>
           </a:p>
@@ -3209,6 +3210,61 @@
       </p:grpSpPr>
       <p:sp>
         <p:nvSpPr>
+          <p:cNvPr id="6" name="Losango 5">
+            <a:extLst>
+              <a:ext uri="{FF2B5EF4-FFF2-40B4-BE49-F238E27FC236}">
+                <a16:creationId xmlns:a16="http://schemas.microsoft.com/office/drawing/2014/main" id="{26E39F2C-DF93-4A97-AFD3-2F42FB354493}"/>
+              </a:ext>
+            </a:extLst>
+          </p:cNvPr>
+          <p:cNvSpPr/>
+          <p:nvPr/>
+        </p:nvSpPr>
+        <p:spPr>
+          <a:xfrm>
+            <a:off x="2290916" y="0"/>
+            <a:ext cx="7610168" cy="6858000"/>
+          </a:xfrm>
+          <a:prstGeom prst="diamond">
+            <a:avLst/>
+          </a:prstGeom>
+          <a:blipFill dpi="0" rotWithShape="1">
+            <a:blip r:embed="rId2">
+              <a:alphaModFix amt="91000"/>
+            </a:blip>
+            <a:srcRect/>
+            <a:stretch>
+              <a:fillRect/>
+            </a:stretch>
+          </a:blipFill>
+        </p:spPr>
+        <p:style>
+          <a:lnRef idx="2">
+            <a:schemeClr val="accent1">
+              <a:shade val="50000"/>
+            </a:schemeClr>
+          </a:lnRef>
+          <a:fillRef idx="1">
+            <a:schemeClr val="accent1"/>
+          </a:fillRef>
+          <a:effectRef idx="0">
+            <a:schemeClr val="accent1"/>
+          </a:effectRef>
+          <a:fontRef idx="minor">
+            <a:schemeClr val="lt1"/>
+          </a:fontRef>
+        </p:style>
+        <p:txBody>
+          <a:bodyPr rtlCol="0" anchor="ctr"/>
+          <a:lstStyle/>
+          <a:p>
+            <a:pPr algn="ctr"/>
+            <a:endParaRPr lang="pt-BR"/>
+          </a:p>
+        </p:txBody>
+      </p:sp>
+      <p:sp>
+        <p:nvSpPr>
           <p:cNvPr id="2" name="Título 1"/>
           <p:cNvSpPr>
             <a:spLocks noGrp="1"/>
@@ -3314,7 +3370,16 @@
             </a:pPr>
             <a:r>
               <a:rPr lang="pt-BR" dirty="0"/>
-              <a:t>Quando declaramos uma variável dentro de uma função, nós a chamamos de variavel local, pois ela não é vista fora da função. Por exemplo:</a:t>
+              <a:t>Quando declaramos uma variável dentro de uma função, nós a chamamos de variavel local, pois ela não é vista fora da função. </a:t>
+            </a:r>
+          </a:p>
+          <a:p>
+            <a:pPr marL="0" indent="0">
+              <a:buNone/>
+            </a:pPr>
+            <a:r>
+              <a:rPr lang="pt-BR" dirty="0"/>
+              <a:t>Por exemplo:</a:t>
             </a:r>
           </a:p>
           <a:p>
@@ -3377,7 +3442,15 @@
             </a:pPr>
             <a:r>
               <a:rPr lang="pt-BR" dirty="0"/>
-              <a:t>Esse erro ocorre pois como eu disse, a variavel par é local, ou seja, fora dessa função ela não existe.</a:t>
+              <a:t>Esse erro ocorre pois, como eu disse, a </a:t>
+            </a:r>
+            <a:r>
+              <a:rPr lang="pt-BR" dirty="0" err="1"/>
+              <a:t>variavel</a:t>
+            </a:r>
+            <a:r>
+              <a:rPr lang="pt-BR" dirty="0"/>
+              <a:t> 'par' é local, ou seja, fora dessa função ela não existe.</a:t>
             </a:r>
           </a:p>
           <a:p>
@@ -4427,7 +4500,15 @@
             </a:pPr>
             <a:r>
               <a:rPr lang="pt-BR" sz="2000" strike="sngStrike" dirty="0"/>
-              <a:t>Tio nadalete ainda não ensinou isso</a:t>
+              <a:t>Tio </a:t>
+            </a:r>
+            <a:r>
+              <a:rPr lang="pt-BR" sz="2000" strike="sngStrike" dirty="0" err="1"/>
+              <a:t>Nadalete</a:t>
+            </a:r>
+            <a:r>
+              <a:rPr lang="pt-BR" sz="2000" strike="sngStrike" dirty="0"/>
+              <a:t> ainda não ensinou isso</a:t>
             </a:r>
           </a:p>
         </p:txBody>
@@ -4798,6 +4879,60 @@
       </p:grpSpPr>
       <p:sp>
         <p:nvSpPr>
+          <p:cNvPr id="4" name="Lágrima 3">
+            <a:extLst>
+              <a:ext uri="{FF2B5EF4-FFF2-40B4-BE49-F238E27FC236}">
+                <a16:creationId xmlns:a16="http://schemas.microsoft.com/office/drawing/2014/main" id="{B1121C60-98AA-449C-8236-AB6F5485DC1A}"/>
+              </a:ext>
+            </a:extLst>
+          </p:cNvPr>
+          <p:cNvSpPr/>
+          <p:nvPr/>
+        </p:nvSpPr>
+        <p:spPr>
+          <a:xfrm>
+            <a:off x="6990736" y="1843548"/>
+            <a:ext cx="5201264" cy="5014452"/>
+          </a:xfrm>
+          <a:prstGeom prst="teardrop">
+            <a:avLst/>
+          </a:prstGeom>
+          <a:blipFill>
+            <a:blip r:embed="rId2">
+              <a:alphaModFix amt="61000"/>
+            </a:blip>
+            <a:stretch>
+              <a:fillRect/>
+            </a:stretch>
+          </a:blipFill>
+        </p:spPr>
+        <p:style>
+          <a:lnRef idx="2">
+            <a:schemeClr val="accent1">
+              <a:shade val="50000"/>
+            </a:schemeClr>
+          </a:lnRef>
+          <a:fillRef idx="1">
+            <a:schemeClr val="accent1"/>
+          </a:fillRef>
+          <a:effectRef idx="0">
+            <a:schemeClr val="accent1"/>
+          </a:effectRef>
+          <a:fontRef idx="minor">
+            <a:schemeClr val="lt1"/>
+          </a:fontRef>
+        </p:style>
+        <p:txBody>
+          <a:bodyPr rtlCol="0" anchor="ctr"/>
+          <a:lstStyle/>
+          <a:p>
+            <a:pPr algn="ctr"/>
+            <a:endParaRPr lang="pt-BR"/>
+          </a:p>
+        </p:txBody>
+      </p:sp>
+      <p:sp>
+        <p:nvSpPr>
           <p:cNvPr id="2" name="Título 1">
             <a:extLst>
               <a:ext uri="{FF2B5EF4-FFF2-40B4-BE49-F238E27FC236}">
@@ -4850,8 +4985,14 @@
             </a:pPr>
             <a:r>
               <a:rPr lang="pt-BR" dirty="0"/>
-              <a:t>Podemos entender o dicionário como uma lista, onde ao invés de ter um índice fixo, nós a escolhemos.</a:t>
-            </a:r>
+              <a:t>Podemos entender o dicionário como uma lista, onde, ao invés de termos um índice fixo, podemos escolher como vamos defini-lo.</a:t>
+            </a:r>
+          </a:p>
+          <a:p>
+            <a:pPr marL="0" indent="0">
+              <a:buNone/>
+            </a:pPr>
+            <a:endParaRPr lang="pt-BR" dirty="0"/>
           </a:p>
           <a:p>
             <a:pPr marL="0" indent="0">
@@ -4861,6 +5002,12 @@
               <a:rPr lang="pt-BR" dirty="0"/>
               <a:t>Em uma lista, para acessarmos um determinado elemento, utilizamos os numeros de 0 a N.</a:t>
             </a:r>
+          </a:p>
+          <a:p>
+            <a:pPr marL="0" indent="0">
+              <a:buNone/>
+            </a:pPr>
+            <a:endParaRPr lang="pt-BR" dirty="0"/>
           </a:p>
           <a:p>
             <a:pPr marL="0" indent="0">
@@ -5785,7 +5932,7 @@
             </a:pPr>
             <a:r>
               <a:rPr lang="pt-BR" dirty="0"/>
-              <a:t>Pode ser utilizado </a:t>
+              <a:t>Podemos utilizar </a:t>
             </a:r>
             <a:r>
               <a:rPr lang="pt-BR" dirty="0" err="1"/>
@@ -5793,7 +5940,16 @@
             </a:r>
             <a:r>
               <a:rPr lang="pt-BR" dirty="0"/>
-              <a:t> ou números, varia de acordo com o que você quiser fazer.</a:t>
+              <a:t> ou números.</a:t>
+            </a:r>
+          </a:p>
+          <a:p>
+            <a:pPr marL="0" indent="0">
+              <a:buNone/>
+            </a:pPr>
+            <a:r>
+              <a:rPr lang="pt-BR" dirty="0"/>
+              <a:t>O critério varia de acordo com o que você quiser fazer.</a:t>
             </a:r>
           </a:p>
           <a:p>
@@ -5863,13 +6019,13 @@
           <p:nvPr>
             <p:extLst>
               <p:ext uri="{D42A27DB-BD31-4B8C-83A1-F6EECF244321}">
-                <p14:modId xmlns:p14="http://schemas.microsoft.com/office/powerpoint/2010/main" val="1016308338"/>
+                <p14:modId xmlns:p14="http://schemas.microsoft.com/office/powerpoint/2010/main" val="2967666964"/>
               </p:ext>
             </p:extLst>
           </p:nvPr>
         </p:nvGraphicFramePr>
         <p:xfrm>
-          <a:off x="404223" y="2298700"/>
+          <a:off x="404223" y="2466860"/>
           <a:ext cx="10354135" cy="365760"/>
         </p:xfrm>
         <a:graphic>
@@ -6501,7 +6657,7 @@
             </a:pPr>
             <a:r>
               <a:rPr lang="pt-BR" dirty="0"/>
-              <a:t>É possivel tambem fazer operações matemáticas utilizando dicionarios!!</a:t>
+              <a:t>Tambem é possivel fazermos operações matemáticas utilizando dicionarios!!!</a:t>
             </a:r>
           </a:p>
           <a:p>
@@ -6539,13 +6695,13 @@
           <p:nvPr>
             <p:extLst>
               <p:ext uri="{D42A27DB-BD31-4B8C-83A1-F6EECF244321}">
-                <p14:modId xmlns:p14="http://schemas.microsoft.com/office/powerpoint/2010/main" val="3179664995"/>
+                <p14:modId xmlns:p14="http://schemas.microsoft.com/office/powerpoint/2010/main" val="4235847572"/>
               </p:ext>
             </p:extLst>
           </p:nvPr>
         </p:nvGraphicFramePr>
         <p:xfrm>
-          <a:off x="378822" y="2179320"/>
+          <a:off x="378822" y="1674827"/>
           <a:ext cx="9374778" cy="2499360"/>
         </p:xfrm>
         <a:graphic>
@@ -6965,6 +7121,60 @@
           </a:graphicData>
         </a:graphic>
       </p:graphicFrame>
+      <p:sp>
+        <p:nvSpPr>
+          <p:cNvPr id="4" name="Lágrima 3">
+            <a:extLst>
+              <a:ext uri="{FF2B5EF4-FFF2-40B4-BE49-F238E27FC236}">
+                <a16:creationId xmlns:a16="http://schemas.microsoft.com/office/drawing/2014/main" id="{BF463DE7-2501-4AF4-886C-86835C9FF1DC}"/>
+              </a:ext>
+            </a:extLst>
+          </p:cNvPr>
+          <p:cNvSpPr/>
+          <p:nvPr/>
+        </p:nvSpPr>
+        <p:spPr>
+          <a:xfrm>
+            <a:off x="6518786" y="1917290"/>
+            <a:ext cx="5673213" cy="4940710"/>
+          </a:xfrm>
+          <a:prstGeom prst="teardrop">
+            <a:avLst/>
+          </a:prstGeom>
+          <a:blipFill>
+            <a:blip r:embed="rId2">
+              <a:alphaModFix amt="61000"/>
+            </a:blip>
+            <a:stretch>
+              <a:fillRect/>
+            </a:stretch>
+          </a:blipFill>
+        </p:spPr>
+        <p:style>
+          <a:lnRef idx="2">
+            <a:schemeClr val="accent1">
+              <a:shade val="50000"/>
+            </a:schemeClr>
+          </a:lnRef>
+          <a:fillRef idx="1">
+            <a:schemeClr val="accent1"/>
+          </a:fillRef>
+          <a:effectRef idx="0">
+            <a:schemeClr val="accent1"/>
+          </a:effectRef>
+          <a:fontRef idx="minor">
+            <a:schemeClr val="lt1"/>
+          </a:fontRef>
+        </p:style>
+        <p:txBody>
+          <a:bodyPr rtlCol="0" anchor="ctr"/>
+          <a:lstStyle/>
+          <a:p>
+            <a:pPr algn="ctr"/>
+            <a:endParaRPr lang="pt-BR"/>
+          </a:p>
+        </p:txBody>
+      </p:sp>
     </p:spTree>
     <p:extLst>
       <p:ext uri="{BB962C8B-B14F-4D97-AF65-F5344CB8AC3E}">
@@ -7021,7 +7231,7 @@
             </a:pPr>
             <a:r>
               <a:rPr lang="pt-BR" dirty="0"/>
-              <a:t>Para adicionar mais um elemento nesse dicionario, basta fazermos o seguinte:</a:t>
+              <a:t>Para adicionarmos mais um elemento nesse dicionario, basta fazermos o seguinte:</a:t>
             </a:r>
           </a:p>
           <a:p>
@@ -7632,7 +7842,7 @@
             </a:pPr>
             <a:r>
               <a:rPr lang="pt-BR" dirty="0"/>
-              <a:t>Para visualizar uma todas as chaves do dicionario, utilizamos o seguinte comando:</a:t>
+              <a:t>Para visualizarmos todas as chaves do dicionario, utilizamos o seguinte comando:</a:t>
             </a:r>
           </a:p>
         </p:txBody>
@@ -8722,7 +8932,9 @@
           </a:xfrm>
         </p:spPr>
         <p:txBody>
-          <a:bodyPr/>
+          <a:bodyPr>
+            <a:normAutofit fontScale="92500"/>
+          </a:bodyPr>
           <a:lstStyle/>
           <a:p>
             <a:pPr marL="0" indent="0">
@@ -8762,7 +8974,7 @@
             </a:pPr>
             <a:r>
               <a:rPr lang="pt-BR" dirty="0"/>
-              <a:t>Outra maneira, que faz praticamente a mesma coisa é:</a:t>
+              <a:t>Há também outro modo de fazer praticamente a mesma coisa:</a:t>
             </a:r>
           </a:p>
           <a:p>
@@ -8786,7 +8998,37 @@
             </a:pPr>
             <a:r>
               <a:rPr lang="pt-BR" dirty="0"/>
-              <a:t>No lugar do X, nós colocamos </a:t>
+              <a:t>No lugar do </a:t>
+            </a:r>
+            <a:r>
+              <a:rPr lang="pt-BR" dirty="0">
+                <a:solidFill>
+                  <a:srgbClr val="006600"/>
+                </a:solidFill>
+              </a:rPr>
+              <a:t>'</a:t>
+            </a:r>
+            <a:r>
+              <a:rPr lang="pt-BR" dirty="0">
+                <a:solidFill>
+                  <a:srgbClr val="006600"/>
+                </a:solidFill>
+                <a:latin typeface="Arial" panose="020B0604020202020204" pitchFamily="34" charset="0"/>
+                <a:cs typeface="Arial" panose="020B0604020202020204" pitchFamily="34" charset="0"/>
+              </a:rPr>
+              <a:t>X</a:t>
+            </a:r>
+            <a:r>
+              <a:rPr lang="pt-BR" dirty="0">
+                <a:solidFill>
+                  <a:srgbClr val="006600"/>
+                </a:solidFill>
+              </a:rPr>
+              <a:t>'</a:t>
+            </a:r>
+            <a:r>
+              <a:rPr lang="pt-BR" dirty="0"/>
+              <a:t>, nós colocamos </a:t>
             </a:r>
             <a:r>
               <a:rPr lang="pt-BR" dirty="0">
@@ -8806,14 +9048,8 @@
                   <a:srgbClr val="006600"/>
                 </a:solidFill>
               </a:rPr>
-              <a:t> ‘w’</a:t>
-            </a:r>
-            <a:endParaRPr lang="pt-BR" dirty="0"/>
-          </a:p>
-          <a:p>
-            <a:pPr marL="0" indent="0">
-              <a:buNone/>
-            </a:pPr>
+              <a:t> 'w'</a:t>
+            </a:r>
             <a:endParaRPr lang="pt-BR" dirty="0"/>
           </a:p>
         </p:txBody>
@@ -8833,7 +9069,7 @@
           <p:nvPr>
             <p:extLst>
               <p:ext uri="{D42A27DB-BD31-4B8C-83A1-F6EECF244321}">
-                <p14:modId xmlns:p14="http://schemas.microsoft.com/office/powerpoint/2010/main" val="4013982939"/>
+                <p14:modId xmlns:p14="http://schemas.microsoft.com/office/powerpoint/2010/main" val="1622985506"/>
               </p:ext>
             </p:extLst>
           </p:nvPr>
@@ -8967,14 +9203,14 @@
           <p:nvPr>
             <p:extLst>
               <p:ext uri="{D42A27DB-BD31-4B8C-83A1-F6EECF244321}">
-                <p14:modId xmlns:p14="http://schemas.microsoft.com/office/powerpoint/2010/main" val="1542581511"/>
+                <p14:modId xmlns:p14="http://schemas.microsoft.com/office/powerpoint/2010/main" val="1958651047"/>
               </p:ext>
             </p:extLst>
           </p:nvPr>
         </p:nvGraphicFramePr>
         <p:xfrm>
           <a:off x="838200" y="4388298"/>
-          <a:ext cx="5577205" cy="396240"/>
+          <a:ext cx="9085289" cy="502357"/>
         </p:xfrm>
         <a:graphic>
           <a:graphicData uri="http://schemas.openxmlformats.org/drawingml/2006/table">
@@ -8983,7 +9219,7 @@
                 <a:tableStyleId>{16D9F66E-5EB9-4882-86FB-DCBF35E3C3E4}</a:tableStyleId>
               </a:tblPr>
               <a:tblGrid>
-                <a:gridCol w="5577205">
+                <a:gridCol w="9085289">
                   <a:extLst>
                     <a:ext uri="{9D8B030D-6E8A-4147-A177-3AD203B41FA5}">
                       <a16:colId xmlns:a16="http://schemas.microsoft.com/office/drawing/2014/main" val="2511009862"/>
@@ -8991,7 +9227,7 @@
                   </a:extLst>
                 </a:gridCol>
               </a:tblGrid>
-              <a:tr h="370840">
+              <a:tr h="502357">
                 <a:tc>
                   <a:txBody>
                     <a:bodyPr/>
@@ -9038,10 +9274,26 @@
                           <a:solidFill>
                             <a:srgbClr val="006600"/>
                           </a:solidFill>
-                          <a:latin typeface="Arial" panose="020B0604020202020204" pitchFamily="34" charset="0"/>
-                          <a:cs typeface="Arial" panose="020B0604020202020204" pitchFamily="34" charset="0"/>
-                        </a:rPr>
-                        <a:t>'nomearquivo.txt'</a:t>
+                        </a:rPr>
+                        <a:t>'</a:t>
+                      </a:r>
+                      <a:r>
+                        <a:rPr lang="pt-BR" sz="2000" dirty="0">
+                          <a:solidFill>
+                            <a:srgbClr val="006600"/>
+                          </a:solidFill>
+                          <a:latin typeface="Arial" panose="020B0604020202020204" pitchFamily="34" charset="0"/>
+                          <a:cs typeface="Arial" panose="020B0604020202020204" pitchFamily="34" charset="0"/>
+                        </a:rPr>
+                        <a:t>nomearquivo.txt</a:t>
+                      </a:r>
+                      <a:r>
+                        <a:rPr lang="pt-BR" sz="2000" dirty="0">
+                          <a:solidFill>
+                            <a:srgbClr val="006600"/>
+                          </a:solidFill>
+                        </a:rPr>
+                        <a:t>'</a:t>
                       </a:r>
                       <a:r>
                         <a:rPr lang="pt-BR" sz="2000" dirty="0">
@@ -9058,10 +9310,26 @@
                           <a:solidFill>
                             <a:srgbClr val="006600"/>
                           </a:solidFill>
-                          <a:latin typeface="Arial" panose="020B0604020202020204" pitchFamily="34" charset="0"/>
-                          <a:cs typeface="Arial" panose="020B0604020202020204" pitchFamily="34" charset="0"/>
-                        </a:rPr>
-                        <a:t>'X’</a:t>
+                        </a:rPr>
+                        <a:t>'</a:t>
+                      </a:r>
+                      <a:r>
+                        <a:rPr lang="pt-BR" sz="2000" dirty="0">
+                          <a:solidFill>
+                            <a:srgbClr val="006600"/>
+                          </a:solidFill>
+                          <a:latin typeface="Arial" panose="020B0604020202020204" pitchFamily="34" charset="0"/>
+                          <a:cs typeface="Arial" panose="020B0604020202020204" pitchFamily="34" charset="0"/>
+                        </a:rPr>
+                        <a:t>X</a:t>
+                      </a:r>
+                      <a:r>
+                        <a:rPr lang="pt-BR" sz="2000" dirty="0">
+                          <a:solidFill>
+                            <a:srgbClr val="006600"/>
+                          </a:solidFill>
+                        </a:rPr>
+                        <a:t>'</a:t>
                       </a:r>
                       <a:r>
                         <a:rPr lang="pt-BR" sz="2000" dirty="0">
@@ -9085,7 +9353,7 @@
                           <a:latin typeface="Arial" panose="020B0604020202020204" pitchFamily="34" charset="0"/>
                           <a:cs typeface="Arial" panose="020B0604020202020204" pitchFamily="34" charset="0"/>
                         </a:rPr>
-                        <a:t> variavel</a:t>
+                        <a:t> variável</a:t>
                       </a:r>
                     </a:p>
                   </a:txBody>
@@ -9105,6 +9373,96 @@
     <p:extLst>
       <p:ext uri="{BB962C8B-B14F-4D97-AF65-F5344CB8AC3E}">
         <p14:creationId xmlns:p14="http://schemas.microsoft.com/office/powerpoint/2010/main" val="3533120128"/>
+      </p:ext>
+    </p:extLst>
+  </p:cSld>
+  <p:clrMapOvr>
+    <a:masterClrMapping/>
+  </p:clrMapOvr>
+</p:sld>
+</file>
+
+<file path=ppt/slides/slide20.xml><?xml version="1.0" encoding="utf-8"?>
+<p:sld xmlns:a="http://schemas.openxmlformats.org/drawingml/2006/main" xmlns:r="http://schemas.openxmlformats.org/officeDocument/2006/relationships" xmlns:p="http://schemas.openxmlformats.org/presentationml/2006/main">
+  <p:cSld>
+    <p:spTree>
+      <p:nvGrpSpPr>
+        <p:cNvPr id="1" name=""/>
+        <p:cNvGrpSpPr/>
+        <p:nvPr/>
+      </p:nvGrpSpPr>
+      <p:grpSpPr>
+        <a:xfrm>
+          <a:off x="0" y="0"/>
+          <a:ext cx="0" cy="0"/>
+          <a:chOff x="0" y="0"/>
+          <a:chExt cx="0" cy="0"/>
+        </a:xfrm>
+      </p:grpSpPr>
+      <p:pic>
+        <p:nvPicPr>
+          <p:cNvPr id="5" name="Imagem 4"/>
+          <p:cNvPicPr>
+            <a:picLocks noChangeAspect="1"/>
+          </p:cNvPicPr>
+          <p:nvPr/>
+        </p:nvPicPr>
+        <p:blipFill>
+          <a:blip r:embed="rId2"/>
+          <a:stretch>
+            <a:fillRect/>
+          </a:stretch>
+        </p:blipFill>
+        <p:spPr>
+          <a:xfrm>
+            <a:off x="0" y="-1"/>
+            <a:ext cx="12192000" cy="6858001"/>
+          </a:xfrm>
+          <a:prstGeom prst="rect">
+            <a:avLst/>
+          </a:prstGeom>
+        </p:spPr>
+      </p:pic>
+      <p:pic>
+        <p:nvPicPr>
+          <p:cNvPr id="3" name="Imagem 2">
+            <a:extLst>
+              <a:ext uri="{FF2B5EF4-FFF2-40B4-BE49-F238E27FC236}">
+                <a16:creationId xmlns:a16="http://schemas.microsoft.com/office/drawing/2014/main" id="{E800BAB4-F7A3-4C33-91B2-BF882B0203E4}"/>
+              </a:ext>
+            </a:extLst>
+          </p:cNvPr>
+          <p:cNvPicPr>
+            <a:picLocks noChangeAspect="1"/>
+          </p:cNvPicPr>
+          <p:nvPr/>
+        </p:nvPicPr>
+        <p:blipFill>
+          <a:blip r:embed="rId3">
+            <a:extLst>
+              <a:ext uri="{28A0092B-C50C-407E-A947-70E740481C1C}">
+                <a14:useLocalDpi xmlns:a14="http://schemas.microsoft.com/office/drawing/2010/main" val="0"/>
+              </a:ext>
+            </a:extLst>
+          </a:blip>
+          <a:stretch>
+            <a:fillRect/>
+          </a:stretch>
+        </p:blipFill>
+        <p:spPr>
+          <a:xfrm>
+            <a:off x="5257487" y="4627954"/>
+            <a:ext cx="1677026" cy="1328964"/>
+          </a:xfrm>
+          <a:prstGeom prst="rect">
+            <a:avLst/>
+          </a:prstGeom>
+        </p:spPr>
+      </p:pic>
+    </p:spTree>
+    <p:extLst>
+      <p:ext uri="{BB962C8B-B14F-4D97-AF65-F5344CB8AC3E}">
+        <p14:creationId xmlns:p14="http://schemas.microsoft.com/office/powerpoint/2010/main" val="1221616001"/>
       </p:ext>
     </p:extLst>
   </p:cSld>
@@ -9133,6 +9491,61 @@
       </p:grpSpPr>
       <p:sp>
         <p:nvSpPr>
+          <p:cNvPr id="12" name="Lágrima 11">
+            <a:extLst>
+              <a:ext uri="{FF2B5EF4-FFF2-40B4-BE49-F238E27FC236}">
+                <a16:creationId xmlns:a16="http://schemas.microsoft.com/office/drawing/2014/main" id="{A7526083-2549-4242-8ECE-71FD840A51AB}"/>
+              </a:ext>
+            </a:extLst>
+          </p:cNvPr>
+          <p:cNvSpPr/>
+          <p:nvPr/>
+        </p:nvSpPr>
+        <p:spPr>
+          <a:xfrm>
+            <a:off x="6718852" y="1292087"/>
+            <a:ext cx="5473148" cy="5565913"/>
+          </a:xfrm>
+          <a:prstGeom prst="teardrop">
+            <a:avLst/>
+          </a:prstGeom>
+          <a:blipFill dpi="0" rotWithShape="1">
+            <a:blip r:embed="rId2">
+              <a:alphaModFix amt="50000"/>
+            </a:blip>
+            <a:srcRect/>
+            <a:stretch>
+              <a:fillRect/>
+            </a:stretch>
+          </a:blipFill>
+        </p:spPr>
+        <p:style>
+          <a:lnRef idx="2">
+            <a:schemeClr val="accent1">
+              <a:shade val="50000"/>
+            </a:schemeClr>
+          </a:lnRef>
+          <a:fillRef idx="1">
+            <a:schemeClr val="accent1"/>
+          </a:fillRef>
+          <a:effectRef idx="0">
+            <a:schemeClr val="accent1"/>
+          </a:effectRef>
+          <a:fontRef idx="minor">
+            <a:schemeClr val="lt1"/>
+          </a:fontRef>
+        </p:style>
+        <p:txBody>
+          <a:bodyPr rtlCol="0" anchor="ctr"/>
+          <a:lstStyle/>
+          <a:p>
+            <a:pPr algn="ctr"/>
+            <a:endParaRPr lang="pt-BR"/>
+          </a:p>
+        </p:txBody>
+      </p:sp>
+      <p:sp>
+        <p:nvSpPr>
           <p:cNvPr id="2" name="Título 1">
             <a:extLst>
               <a:ext uri="{FF2B5EF4-FFF2-40B4-BE49-F238E27FC236}">
@@ -9226,7 +9639,7 @@
             </a:pPr>
             <a:r>
               <a:rPr lang="pt-BR" dirty="0"/>
-              <a:t>Então quando você o utiliza, não é necessário fechar o arquivo, diferente do </a:t>
+              <a:t>Portanto, quando você o utiliza, não é necessário fechar o arquivo, diferente do </a:t>
             </a:r>
             <a:r>
               <a:rPr lang="pt-BR" dirty="0">
@@ -9249,10 +9662,10 @@
             </a:pPr>
             <a:r>
               <a:rPr lang="pt-BR" dirty="0"/>
-              <a:t>Porém, quando o </a:t>
-            </a:r>
-            <a:r>
-              <a:rPr lang="pt-BR" dirty="0" err="1">
+              <a:t>Também é necessário lembrar que, quando o </a:t>
+            </a:r>
+            <a:r>
+              <a:rPr lang="pt-BR" b="1" dirty="0" err="1">
                 <a:solidFill>
                   <a:schemeClr val="accent2">
                     <a:lumMod val="75000"/>
@@ -9262,14 +9675,14 @@
               <a:t>with</a:t>
             </a:r>
             <a:r>
-              <a:rPr lang="pt-BR" dirty="0"/>
+              <a:rPr lang="pt-BR" b="1" dirty="0"/>
               <a:t> </a:t>
             </a:r>
             <a:r>
-              <a:rPr lang="pt-BR" dirty="0">
+              <a:rPr lang="pt-BR" b="1" dirty="0">
                 <a:solidFill>
                   <a:schemeClr val="accent6">
-                    <a:lumMod val="75000"/>
+                    <a:lumMod val="50000"/>
                   </a:schemeClr>
                 </a:solidFill>
               </a:rPr>
@@ -9280,7 +9693,7 @@
               <a:t>() é utilizado, todo o código deve ser </a:t>
             </a:r>
             <a:r>
-              <a:rPr lang="pt-BR" dirty="0" err="1"/>
+              <a:rPr lang="pt-BR" u="sng" dirty="0" err="1"/>
               <a:t>identado</a:t>
             </a:r>
             <a:r>
@@ -9394,11 +9807,8 @@
             </a:pPr>
             <a:r>
               <a:rPr lang="pt-BR" dirty="0"/>
-              <a:t>Trocando aquele X por:</a:t>
-            </a:r>
-          </a:p>
-          <a:p>
-            <a:pPr fontAlgn="base"/>
+              <a:t>Trocando aquele </a:t>
+            </a:r>
             <a:r>
               <a:rPr lang="pt-BR" dirty="0">
                 <a:solidFill>
@@ -9408,6 +9818,39 @@
               <a:t>'</a:t>
             </a:r>
             <a:r>
+              <a:rPr lang="pt-BR" dirty="0">
+                <a:solidFill>
+                  <a:srgbClr val="006600"/>
+                </a:solidFill>
+                <a:latin typeface="Arial" panose="020B0604020202020204" pitchFamily="34" charset="0"/>
+                <a:cs typeface="Arial" panose="020B0604020202020204" pitchFamily="34" charset="0"/>
+              </a:rPr>
+              <a:t>X</a:t>
+            </a:r>
+            <a:r>
+              <a:rPr lang="pt-BR" dirty="0">
+                <a:solidFill>
+                  <a:srgbClr val="006600"/>
+                </a:solidFill>
+              </a:rPr>
+              <a:t>'</a:t>
+            </a:r>
+            <a:r>
+              <a:rPr lang="pt-BR" dirty="0"/>
+              <a:t> por:</a:t>
+            </a:r>
+          </a:p>
+          <a:p>
+            <a:pPr fontAlgn="base"/>
+            <a:r>
+              <a:rPr lang="pt-BR" dirty="0">
+                <a:solidFill>
+                  <a:srgbClr val="006600"/>
+                </a:solidFill>
+              </a:rPr>
+              <a:t>'</a:t>
+            </a:r>
+            <a:r>
               <a:rPr lang="pt-BR" b="1" dirty="0">
                 <a:solidFill>
                   <a:srgbClr val="006600"/>
@@ -9456,7 +9899,7 @@
             </a:r>
             <a:r>
               <a:rPr lang="pt-BR" dirty="0"/>
-              <a:t>–  Para apenas escrever (um arquivo existente com o mesmo nome será apagado).</a:t>
+              <a:t>–  Para apenas escrever (se existir um arquivo com o mesmo nome, será sobrescrito).</a:t>
             </a:r>
           </a:p>
           <a:p>
@@ -9503,7 +9946,7 @@
             </a:r>
             <a:r>
               <a:rPr lang="pt-BR" dirty="0"/>
-              <a:t>Abre o arquivo para leitura e escrita. Porém, o arquivo já deve existir (na mesma pasta que está o arquivo.py).</a:t>
+              <a:t>Abre o arquivo para leitura e escrita, porém o arquivo já deve existir (na mesma pasta que está o arquivo.py).</a:t>
             </a:r>
             <a:endParaRPr lang="pt-BR" b="1" dirty="0">
               <a:solidFill>
@@ -9539,7 +9982,7 @@
             </a:r>
             <a:r>
               <a:rPr lang="pt-BR" dirty="0"/>
-              <a:t>–  Abre o arquivo para leitura e escrita. Se o arquivo já existir, ele será deletado.</a:t>
+              <a:t>–  Abre o arquivo para leitura e escrita, porém, se o arquivo já existir, ele será sobrescrito.</a:t>
             </a:r>
           </a:p>
           <a:p>
@@ -10236,7 +10679,7 @@
           <p:nvPr>
             <p:extLst>
               <p:ext uri="{D42A27DB-BD31-4B8C-83A1-F6EECF244321}">
-                <p14:modId xmlns:p14="http://schemas.microsoft.com/office/powerpoint/2010/main" val="4291529559"/>
+                <p14:modId xmlns:p14="http://schemas.microsoft.com/office/powerpoint/2010/main" val="1313972755"/>
               </p:ext>
             </p:extLst>
           </p:nvPr>
@@ -10288,7 +10731,7 @@
                           <a:latin typeface="Arial" panose="020B0604020202020204" pitchFamily="34" charset="0"/>
                           <a:cs typeface="Arial" panose="020B0604020202020204" pitchFamily="34" charset="0"/>
                         </a:rPr>
-                        <a:t>'O que você quiser'</a:t>
+                        <a:t>‘o que você quiser'</a:t>
                       </a:r>
                       <a:r>
                         <a:rPr lang="pt-BR" sz="2000" dirty="0">
@@ -11075,16 +11518,37 @@
             </a:pPr>
             <a:r>
               <a:rPr lang="pt-BR" dirty="0"/>
+              <a:t>Funções são rotinas que são capazes de executar instruções e retornar um resultado.</a:t>
+            </a:r>
+          </a:p>
+          <a:p>
+            <a:pPr marL="0" indent="0">
+              <a:buNone/>
+            </a:pPr>
+            <a:endParaRPr lang="pt-BR" dirty="0"/>
+          </a:p>
+          <a:p>
+            <a:pPr marL="0" indent="0">
+              <a:buNone/>
+            </a:pPr>
+            <a:r>
+              <a:rPr lang="pt-BR" dirty="0"/>
+              <a:t>Podem existir funções que apenas executam ações e não retornam nenhum resultado.</a:t>
+            </a:r>
+          </a:p>
+          <a:p>
+            <a:pPr marL="0" indent="0">
+              <a:buNone/>
+            </a:pPr>
+            <a:endParaRPr lang="pt-BR" dirty="0"/>
+          </a:p>
+          <a:p>
+            <a:pPr marL="0" indent="0">
+              <a:buNone/>
+            </a:pPr>
+            <a:r>
+              <a:rPr lang="pt-BR" dirty="0"/>
               <a:t>Em Python, para definirmos uma função, utilizamos o def.</a:t>
-            </a:r>
-          </a:p>
-          <a:p>
-            <a:pPr marL="0" indent="0">
-              <a:buNone/>
-            </a:pPr>
-            <a:r>
-              <a:rPr lang="pt-BR" dirty="0"/>
-              <a:t>Funções são rotinas que são capazes de executar instruções e retornar um resultado. Podem existir funções que apenas executam ações e não retornam nenhum resultado.</a:t>
             </a:r>
           </a:p>
           <a:p>
@@ -11124,6 +11588,60 @@
       </p:grpSpPr>
       <p:sp>
         <p:nvSpPr>
+          <p:cNvPr id="5" name="Lágrima 4">
+            <a:extLst>
+              <a:ext uri="{FF2B5EF4-FFF2-40B4-BE49-F238E27FC236}">
+                <a16:creationId xmlns:a16="http://schemas.microsoft.com/office/drawing/2014/main" id="{6237B585-AF49-46BD-A4F5-4D474742E312}"/>
+              </a:ext>
+            </a:extLst>
+          </p:cNvPr>
+          <p:cNvSpPr/>
+          <p:nvPr/>
+        </p:nvSpPr>
+        <p:spPr>
+          <a:xfrm>
+            <a:off x="6990736" y="1843548"/>
+            <a:ext cx="5201264" cy="5014452"/>
+          </a:xfrm>
+          <a:prstGeom prst="teardrop">
+            <a:avLst/>
+          </a:prstGeom>
+          <a:blipFill>
+            <a:blip r:embed="rId2">
+              <a:alphaModFix amt="61000"/>
+            </a:blip>
+            <a:stretch>
+              <a:fillRect/>
+            </a:stretch>
+          </a:blipFill>
+        </p:spPr>
+        <p:style>
+          <a:lnRef idx="2">
+            <a:schemeClr val="accent1">
+              <a:shade val="50000"/>
+            </a:schemeClr>
+          </a:lnRef>
+          <a:fillRef idx="1">
+            <a:schemeClr val="accent1"/>
+          </a:fillRef>
+          <a:effectRef idx="0">
+            <a:schemeClr val="accent1"/>
+          </a:effectRef>
+          <a:fontRef idx="minor">
+            <a:schemeClr val="lt1"/>
+          </a:fontRef>
+        </p:style>
+        <p:txBody>
+          <a:bodyPr rtlCol="0" anchor="ctr"/>
+          <a:lstStyle/>
+          <a:p>
+            <a:pPr algn="ctr"/>
+            <a:endParaRPr lang="pt-BR"/>
+          </a:p>
+        </p:txBody>
+      </p:sp>
+      <p:sp>
+        <p:nvSpPr>
           <p:cNvPr id="3" name="Espaço Reservado para Conteúdo 2">
             <a:extLst>
               <a:ext uri="{FF2B5EF4-FFF2-40B4-BE49-F238E27FC236}">
@@ -11140,12 +11658,14 @@
         </p:nvSpPr>
         <p:spPr>
           <a:xfrm>
-            <a:off x="838200" y="1825625"/>
-            <a:ext cx="10515600" cy="4351338"/>
+            <a:off x="838200" y="1702671"/>
+            <a:ext cx="10515600" cy="4631942"/>
           </a:xfrm>
         </p:spPr>
         <p:txBody>
-          <a:bodyPr/>
+          <a:bodyPr>
+            <a:normAutofit/>
+          </a:bodyPr>
           <a:lstStyle/>
           <a:p>
             <a:pPr marL="0" indent="0">
@@ -11153,8 +11673,29 @@
             </a:pPr>
             <a:r>
               <a:rPr lang="pt-BR" dirty="0"/>
-              <a:t>Uma função serve para deixar o codigo mais organizado. Em códigos muito grandes, ela gera uma facilidade, pois se precisamos mudar alguma coisa, basta irmos ate a função e alterar apenas a própria função, sem ter que ficar alterando muita coisa no código inteiro.</a:t>
-            </a:r>
+              <a:t>Uma função serve para executar rotinas que se repetem, além de  deixar o codigo mais organizado.</a:t>
+            </a:r>
+          </a:p>
+          <a:p>
+            <a:pPr marL="0" indent="0">
+              <a:buNone/>
+            </a:pPr>
+            <a:endParaRPr lang="pt-BR" dirty="0"/>
+          </a:p>
+          <a:p>
+            <a:pPr marL="0" indent="0">
+              <a:buNone/>
+            </a:pPr>
+            <a:r>
+              <a:rPr lang="pt-BR" dirty="0"/>
+              <a:t>Em códigos muito grandes, ela gera uma facilidade, pois se precisamos mudar alguma coisa, basta irmos ate a função e alterar apenas a própria função, sem ter que ficar alterando muita coisa no código inteiro.</a:t>
+            </a:r>
+          </a:p>
+          <a:p>
+            <a:pPr marL="0" indent="0">
+              <a:buNone/>
+            </a:pPr>
+            <a:endParaRPr lang="pt-BR" dirty="0"/>
           </a:p>
           <a:p>
             <a:pPr marL="0" indent="0">

</xml_diff>